<commit_message>
updated the list of general chairs
</commit_message>
<xml_diff>
--- a/resources/ISORC2018_CFP.pptx
+++ b/resources/ISORC2018_CFP.pptx
@@ -104,6 +104,11 @@
       </a:defRPr>
     </a:lvl9pPr>
   </p:defaultTextStyle>
+  <p:extLst>
+    <p:ext uri="{EFAFB233-063F-42B5-8137-9DF3F51BA10A}">
+      <p15:sldGuideLst xmlns:p15="http://schemas.microsoft.com/office/powerpoint/2012/main"/>
+    </p:ext>
+  </p:extLst>
 </p:presentation>
 </file>
 
@@ -238,7 +243,7 @@
           <a:p>
             <a:fld id="{2CFE5979-A821-46A4-88EE-AE2ED76C3A19}" type="datetimeFigureOut">
               <a:rPr lang="en-US" smtClean="0"/>
-              <a:t>05-Sep-17</a:t>
+              <a:t>06-Sep-17</a:t>
             </a:fld>
             <a:endParaRPr lang="en-US"/>
           </a:p>
@@ -408,7 +413,7 @@
           <a:p>
             <a:fld id="{2CFE5979-A821-46A4-88EE-AE2ED76C3A19}" type="datetimeFigureOut">
               <a:rPr lang="en-US" smtClean="0"/>
-              <a:t>05-Sep-17</a:t>
+              <a:t>06-Sep-17</a:t>
             </a:fld>
             <a:endParaRPr lang="en-US"/>
           </a:p>
@@ -588,7 +593,7 @@
           <a:p>
             <a:fld id="{2CFE5979-A821-46A4-88EE-AE2ED76C3A19}" type="datetimeFigureOut">
               <a:rPr lang="en-US" smtClean="0"/>
-              <a:t>05-Sep-17</a:t>
+              <a:t>06-Sep-17</a:t>
             </a:fld>
             <a:endParaRPr lang="en-US"/>
           </a:p>
@@ -758,7 +763,7 @@
           <a:p>
             <a:fld id="{2CFE5979-A821-46A4-88EE-AE2ED76C3A19}" type="datetimeFigureOut">
               <a:rPr lang="en-US" smtClean="0"/>
-              <a:t>05-Sep-17</a:t>
+              <a:t>06-Sep-17</a:t>
             </a:fld>
             <a:endParaRPr lang="en-US"/>
           </a:p>
@@ -1002,7 +1007,7 @@
           <a:p>
             <a:fld id="{2CFE5979-A821-46A4-88EE-AE2ED76C3A19}" type="datetimeFigureOut">
               <a:rPr lang="en-US" smtClean="0"/>
-              <a:t>05-Sep-17</a:t>
+              <a:t>06-Sep-17</a:t>
             </a:fld>
             <a:endParaRPr lang="en-US"/>
           </a:p>
@@ -1234,7 +1239,7 @@
           <a:p>
             <a:fld id="{2CFE5979-A821-46A4-88EE-AE2ED76C3A19}" type="datetimeFigureOut">
               <a:rPr lang="en-US" smtClean="0"/>
-              <a:t>05-Sep-17</a:t>
+              <a:t>06-Sep-17</a:t>
             </a:fld>
             <a:endParaRPr lang="en-US"/>
           </a:p>
@@ -1601,7 +1606,7 @@
           <a:p>
             <a:fld id="{2CFE5979-A821-46A4-88EE-AE2ED76C3A19}" type="datetimeFigureOut">
               <a:rPr lang="en-US" smtClean="0"/>
-              <a:t>05-Sep-17</a:t>
+              <a:t>06-Sep-17</a:t>
             </a:fld>
             <a:endParaRPr lang="en-US"/>
           </a:p>
@@ -1719,7 +1724,7 @@
           <a:p>
             <a:fld id="{2CFE5979-A821-46A4-88EE-AE2ED76C3A19}" type="datetimeFigureOut">
               <a:rPr lang="en-US" smtClean="0"/>
-              <a:t>05-Sep-17</a:t>
+              <a:t>06-Sep-17</a:t>
             </a:fld>
             <a:endParaRPr lang="en-US"/>
           </a:p>
@@ -1814,7 +1819,7 @@
           <a:p>
             <a:fld id="{2CFE5979-A821-46A4-88EE-AE2ED76C3A19}" type="datetimeFigureOut">
               <a:rPr lang="en-US" smtClean="0"/>
-              <a:t>05-Sep-17</a:t>
+              <a:t>06-Sep-17</a:t>
             </a:fld>
             <a:endParaRPr lang="en-US"/>
           </a:p>
@@ -2091,7 +2096,7 @@
           <a:p>
             <a:fld id="{2CFE5979-A821-46A4-88EE-AE2ED76C3A19}" type="datetimeFigureOut">
               <a:rPr lang="en-US" smtClean="0"/>
-              <a:t>05-Sep-17</a:t>
+              <a:t>06-Sep-17</a:t>
             </a:fld>
             <a:endParaRPr lang="en-US"/>
           </a:p>
@@ -2348,7 +2353,7 @@
           <a:p>
             <a:fld id="{2CFE5979-A821-46A4-88EE-AE2ED76C3A19}" type="datetimeFigureOut">
               <a:rPr lang="en-US" smtClean="0"/>
-              <a:t>05-Sep-17</a:t>
+              <a:t>06-Sep-17</a:t>
             </a:fld>
             <a:endParaRPr lang="en-US"/>
           </a:p>
@@ -2561,7 +2566,7 @@
           <a:p>
             <a:fld id="{2CFE5979-A821-46A4-88EE-AE2ED76C3A19}" type="datetimeFigureOut">
               <a:rPr lang="en-US" smtClean="0"/>
-              <a:t>05-Sep-17</a:t>
+              <a:t>06-Sep-17</a:t>
             </a:fld>
             <a:endParaRPr lang="en-US"/>
           </a:p>
@@ -3510,7 +3515,7 @@
         <p:spPr>
           <a:xfrm>
             <a:off x="40459" y="2418755"/>
-            <a:ext cx="1909450" cy="6524863"/>
+            <a:ext cx="1909450" cy="7032694"/>
           </a:xfrm>
           <a:prstGeom prst="rect">
             <a:avLst/>
@@ -3589,7 +3594,49 @@
                   <a:srgbClr val="000000"/>
                 </a:solidFill>
               </a:rPr>
-              <a:t>University of Leeds, UK</a:t>
+              <a:t>University of Leeds, </a:t>
+            </a:r>
+            <a:r>
+              <a:rPr lang="en-US" sz="1100" dirty="0" smtClean="0">
+                <a:solidFill>
+                  <a:srgbClr val="000000"/>
+                </a:solidFill>
+              </a:rPr>
+              <a:t>UK</a:t>
+            </a:r>
+            <a:endParaRPr lang="en-US" sz="1100" b="1" dirty="0"/>
+          </a:p>
+          <a:p>
+            <a:r>
+              <a:rPr lang="en-US" sz="1100" b="1" dirty="0">
+                <a:solidFill>
+                  <a:srgbClr val="000000"/>
+                </a:solidFill>
+              </a:rPr>
+              <a:t>Joel </a:t>
+            </a:r>
+            <a:r>
+              <a:rPr lang="en-US" sz="1100" b="1" dirty="0" err="1" smtClean="0">
+                <a:solidFill>
+                  <a:srgbClr val="000000"/>
+                </a:solidFill>
+              </a:rPr>
+              <a:t>Sherill</a:t>
+            </a:r>
+            <a:endParaRPr lang="en-US" sz="1100" b="1" dirty="0" smtClean="0">
+              <a:solidFill>
+                <a:srgbClr val="000000"/>
+              </a:solidFill>
+            </a:endParaRPr>
+          </a:p>
+          <a:p>
+            <a:r>
+              <a:rPr lang="en-US" sz="1100" dirty="0">
+                <a:solidFill>
+                  <a:srgbClr val="000000"/>
+                </a:solidFill>
+              </a:rPr>
+              <a:t> OAR Corporation, USA</a:t>
             </a:r>
             <a:endParaRPr lang="en-US" sz="1100" dirty="0" smtClean="0">
               <a:solidFill>

</xml_diff>

<commit_message>
Abhishek Dubey as contact for paper submission
</commit_message>
<xml_diff>
--- a/resources/ISORC2018_CFP.pptx
+++ b/resources/ISORC2018_CFP.pptx
@@ -3631,12 +3631,20 @@
           </a:p>
           <a:p>
             <a:r>
+              <a:rPr lang="en-US" sz="1100" smtClean="0">
+                <a:solidFill>
+                  <a:srgbClr val="000000"/>
+                </a:solidFill>
+              </a:rPr>
+              <a:t>OAR </a:t>
+            </a:r>
+            <a:r>
               <a:rPr lang="en-US" sz="1100" dirty="0">
                 <a:solidFill>
                   <a:srgbClr val="000000"/>
                 </a:solidFill>
               </a:rPr>
-              <a:t> OAR Corporation, USA</a:t>
+              <a:t>Corporation, USA</a:t>
             </a:r>
             <a:endParaRPr lang="en-US" sz="1100" dirty="0" smtClean="0">
               <a:solidFill>
@@ -4160,7 +4168,7 @@
         <p:spPr>
           <a:xfrm>
             <a:off x="1807031" y="9095702"/>
-            <a:ext cx="3264099" cy="646331"/>
+            <a:ext cx="3343608" cy="646331"/>
           </a:xfrm>
           <a:prstGeom prst="rect">
             <a:avLst/>
@@ -4214,7 +4222,15 @@
                   <a:schemeClr val="bg1"/>
                 </a:solidFill>
               </a:rPr>
-              <a:t>Email: TBA</a:t>
+              <a:t>Email: </a:t>
+            </a:r>
+            <a:r>
+              <a:rPr lang="en-US" sz="1200" dirty="0" err="1" smtClean="0">
+                <a:solidFill>
+                  <a:schemeClr val="bg1"/>
+                </a:solidFill>
+              </a:rPr>
+              <a:t>abhishek.dubey@Vanderbilt.Edu</a:t>
             </a:r>
             <a:endParaRPr lang="en-US" sz="1200" dirty="0">
               <a:solidFill>

</xml_diff>

<commit_message>
new deadline feb 14th
</commit_message>
<xml_diff>
--- a/resources/ISORC2018_CFP.pptx
+++ b/resources/ISORC2018_CFP.pptx
@@ -243,7 +243,7 @@
           <a:p>
             <a:fld id="{2CFE5979-A821-46A4-88EE-AE2ED76C3A19}" type="datetimeFigureOut">
               <a:rPr lang="en-US" smtClean="0"/>
-              <a:t>1/23/2018</a:t>
+              <a:t>2/9/2018</a:t>
             </a:fld>
             <a:endParaRPr lang="en-US"/>
           </a:p>
@@ -413,7 +413,7 @@
           <a:p>
             <a:fld id="{2CFE5979-A821-46A4-88EE-AE2ED76C3A19}" type="datetimeFigureOut">
               <a:rPr lang="en-US" smtClean="0"/>
-              <a:t>1/23/2018</a:t>
+              <a:t>2/9/2018</a:t>
             </a:fld>
             <a:endParaRPr lang="en-US"/>
           </a:p>
@@ -593,7 +593,7 @@
           <a:p>
             <a:fld id="{2CFE5979-A821-46A4-88EE-AE2ED76C3A19}" type="datetimeFigureOut">
               <a:rPr lang="en-US" smtClean="0"/>
-              <a:t>1/23/2018</a:t>
+              <a:t>2/9/2018</a:t>
             </a:fld>
             <a:endParaRPr lang="en-US"/>
           </a:p>
@@ -763,7 +763,7 @@
           <a:p>
             <a:fld id="{2CFE5979-A821-46A4-88EE-AE2ED76C3A19}" type="datetimeFigureOut">
               <a:rPr lang="en-US" smtClean="0"/>
-              <a:t>1/23/2018</a:t>
+              <a:t>2/9/2018</a:t>
             </a:fld>
             <a:endParaRPr lang="en-US"/>
           </a:p>
@@ -1007,7 +1007,7 @@
           <a:p>
             <a:fld id="{2CFE5979-A821-46A4-88EE-AE2ED76C3A19}" type="datetimeFigureOut">
               <a:rPr lang="en-US" smtClean="0"/>
-              <a:t>1/23/2018</a:t>
+              <a:t>2/9/2018</a:t>
             </a:fld>
             <a:endParaRPr lang="en-US"/>
           </a:p>
@@ -1239,7 +1239,7 @@
           <a:p>
             <a:fld id="{2CFE5979-A821-46A4-88EE-AE2ED76C3A19}" type="datetimeFigureOut">
               <a:rPr lang="en-US" smtClean="0"/>
-              <a:t>1/23/2018</a:t>
+              <a:t>2/9/2018</a:t>
             </a:fld>
             <a:endParaRPr lang="en-US"/>
           </a:p>
@@ -1606,7 +1606,7 @@
           <a:p>
             <a:fld id="{2CFE5979-A821-46A4-88EE-AE2ED76C3A19}" type="datetimeFigureOut">
               <a:rPr lang="en-US" smtClean="0"/>
-              <a:t>1/23/2018</a:t>
+              <a:t>2/9/2018</a:t>
             </a:fld>
             <a:endParaRPr lang="en-US"/>
           </a:p>
@@ -1724,7 +1724,7 @@
           <a:p>
             <a:fld id="{2CFE5979-A821-46A4-88EE-AE2ED76C3A19}" type="datetimeFigureOut">
               <a:rPr lang="en-US" smtClean="0"/>
-              <a:t>1/23/2018</a:t>
+              <a:t>2/9/2018</a:t>
             </a:fld>
             <a:endParaRPr lang="en-US"/>
           </a:p>
@@ -1819,7 +1819,7 @@
           <a:p>
             <a:fld id="{2CFE5979-A821-46A4-88EE-AE2ED76C3A19}" type="datetimeFigureOut">
               <a:rPr lang="en-US" smtClean="0"/>
-              <a:t>1/23/2018</a:t>
+              <a:t>2/9/2018</a:t>
             </a:fld>
             <a:endParaRPr lang="en-US"/>
           </a:p>
@@ -2096,7 +2096,7 @@
           <a:p>
             <a:fld id="{2CFE5979-A821-46A4-88EE-AE2ED76C3A19}" type="datetimeFigureOut">
               <a:rPr lang="en-US" smtClean="0"/>
-              <a:t>1/23/2018</a:t>
+              <a:t>2/9/2018</a:t>
             </a:fld>
             <a:endParaRPr lang="en-US"/>
           </a:p>
@@ -2353,7 +2353,7 @@
           <a:p>
             <a:fld id="{2CFE5979-A821-46A4-88EE-AE2ED76C3A19}" type="datetimeFigureOut">
               <a:rPr lang="en-US" smtClean="0"/>
-              <a:t>1/23/2018</a:t>
+              <a:t>2/9/2018</a:t>
             </a:fld>
             <a:endParaRPr lang="en-US"/>
           </a:p>
@@ -2566,7 +2566,7 @@
           <a:p>
             <a:fld id="{2CFE5979-A821-46A4-88EE-AE2ED76C3A19}" type="datetimeFigureOut">
               <a:rPr lang="en-US" smtClean="0"/>
-              <a:t>1/23/2018</a:t>
+              <a:t>2/9/2018</a:t>
             </a:fld>
             <a:endParaRPr lang="en-US"/>
           </a:p>
@@ -3387,8 +3387,8 @@
               <a:t>February </a:t>
             </a:r>
             <a:r>
-              <a:rPr lang="en-US" sz="1200" dirty="0"/>
-              <a:t>9</a:t>
+              <a:rPr lang="en-US" sz="1200" smtClean="0"/>
+              <a:t>14</a:t>
             </a:r>
             <a:r>
               <a:rPr lang="en-US" sz="1200" smtClean="0"/>

</xml_diff>